<commit_message>
week 14 in class
</commit_message>
<xml_diff>
--- a/course_material/week_14/week_14_presentation.pptx
+++ b/course_material/week_14/week_14_presentation.pptx
@@ -5,7 +5,7 @@
     <p:sldMasterId id="2147483696" r:id="rId1"/>
   </p:sldMasterIdLst>
   <p:notesMasterIdLst>
-    <p:notesMasterId r:id="rId13"/>
+    <p:notesMasterId r:id="rId14"/>
   </p:notesMasterIdLst>
   <p:sldIdLst>
     <p:sldId id="256" r:id="rId2"/>
@@ -17,8 +17,9 @@
     <p:sldId id="315" r:id="rId8"/>
     <p:sldId id="311" r:id="rId9"/>
     <p:sldId id="317" r:id="rId10"/>
-    <p:sldId id="318" r:id="rId11"/>
-    <p:sldId id="271" r:id="rId12"/>
+    <p:sldId id="319" r:id="rId11"/>
+    <p:sldId id="318" r:id="rId12"/>
+    <p:sldId id="271" r:id="rId13"/>
   </p:sldIdLst>
   <p:sldSz cx="12192000" cy="6858000"/>
   <p:notesSz cx="6858000" cy="9144000"/>
@@ -1833,7 +1834,7 @@
           <a:p>
             <a:fld id="{5CF9EFDB-215C-4120-ADCB-EAD745B7163E}" type="datetimeFigureOut">
               <a:rPr lang="en-US" smtClean="0"/>
-              <a:t>5/27/2021</a:t>
+              <a:t>5/30/2021</a:t>
             </a:fld>
             <a:endParaRPr lang="en-US"/>
           </a:p>
@@ -2165,7 +2166,7 @@
           <a:p>
             <a:fld id="{791F1524-C5FD-4370-8A10-5BE52A97A495}" type="slidenum">
               <a:rPr lang="en-US" smtClean="0"/>
-              <a:t>3</a:t>
+              <a:t>1</a:t>
             </a:fld>
             <a:endParaRPr lang="en-US"/>
           </a:p>
@@ -2174,7 +2175,91 @@
     </p:spTree>
     <p:extLst>
       <p:ext uri="{BB962C8B-B14F-4D97-AF65-F5344CB8AC3E}">
-        <p14:creationId xmlns:p14="http://schemas.microsoft.com/office/powerpoint/2010/main" val="2669578412"/>
+        <p14:creationId xmlns:p14="http://schemas.microsoft.com/office/powerpoint/2010/main" val="1932021985"/>
+      </p:ext>
+    </p:extLst>
+  </p:cSld>
+  <p:clrMapOvr>
+    <a:masterClrMapping/>
+  </p:clrMapOvr>
+</p:notes>
+</file>
+
+<file path=ppt/notesSlides/notesSlide10.xml><?xml version="1.0" encoding="utf-8"?>
+<p:notes xmlns:a="http://schemas.openxmlformats.org/drawingml/2006/main" xmlns:r="http://schemas.openxmlformats.org/officeDocument/2006/relationships" xmlns:p="http://schemas.openxmlformats.org/presentationml/2006/main">
+  <p:cSld>
+    <p:spTree>
+      <p:nvGrpSpPr>
+        <p:cNvPr id="1" name=""/>
+        <p:cNvGrpSpPr/>
+        <p:nvPr/>
+      </p:nvGrpSpPr>
+      <p:grpSpPr>
+        <a:xfrm>
+          <a:off x="0" y="0"/>
+          <a:ext cx="0" cy="0"/>
+          <a:chOff x="0" y="0"/>
+          <a:chExt cx="0" cy="0"/>
+        </a:xfrm>
+      </p:grpSpPr>
+      <p:sp>
+        <p:nvSpPr>
+          <p:cNvPr id="2" name="Slide Image Placeholder 1"/>
+          <p:cNvSpPr>
+            <a:spLocks noGrp="1" noRot="1" noChangeAspect="1"/>
+          </p:cNvSpPr>
+          <p:nvPr>
+            <p:ph type="sldImg"/>
+          </p:nvPr>
+        </p:nvSpPr>
+        <p:spPr/>
+      </p:sp>
+      <p:sp>
+        <p:nvSpPr>
+          <p:cNvPr id="3" name="Notes Placeholder 2"/>
+          <p:cNvSpPr>
+            <a:spLocks noGrp="1"/>
+          </p:cNvSpPr>
+          <p:nvPr>
+            <p:ph type="body" idx="1"/>
+          </p:nvPr>
+        </p:nvSpPr>
+        <p:spPr/>
+        <p:txBody>
+          <a:bodyPr/>
+          <a:lstStyle/>
+          <a:p>
+            <a:endParaRPr lang="en-US" dirty="0"/>
+          </a:p>
+        </p:txBody>
+      </p:sp>
+      <p:sp>
+        <p:nvSpPr>
+          <p:cNvPr id="4" name="Slide Number Placeholder 3"/>
+          <p:cNvSpPr>
+            <a:spLocks noGrp="1"/>
+          </p:cNvSpPr>
+          <p:nvPr>
+            <p:ph type="sldNum" sz="quarter" idx="5"/>
+          </p:nvPr>
+        </p:nvSpPr>
+        <p:spPr/>
+        <p:txBody>
+          <a:bodyPr/>
+          <a:lstStyle/>
+          <a:p>
+            <a:fld id="{791F1524-C5FD-4370-8A10-5BE52A97A495}" type="slidenum">
+              <a:rPr lang="en-US" smtClean="0"/>
+              <a:t>12</a:t>
+            </a:fld>
+            <a:endParaRPr lang="en-US"/>
+          </a:p>
+        </p:txBody>
+      </p:sp>
+    </p:spTree>
+    <p:extLst>
+      <p:ext uri="{BB962C8B-B14F-4D97-AF65-F5344CB8AC3E}">
+        <p14:creationId xmlns:p14="http://schemas.microsoft.com/office/powerpoint/2010/main" val="3603489253"/>
       </p:ext>
     </p:extLst>
   </p:cSld>
@@ -2249,7 +2334,7 @@
           <a:p>
             <a:fld id="{791F1524-C5FD-4370-8A10-5BE52A97A495}" type="slidenum">
               <a:rPr lang="en-US" smtClean="0"/>
-              <a:t>4</a:t>
+              <a:t>3</a:t>
             </a:fld>
             <a:endParaRPr lang="en-US"/>
           </a:p>
@@ -2258,7 +2343,7 @@
     </p:spTree>
     <p:extLst>
       <p:ext uri="{BB962C8B-B14F-4D97-AF65-F5344CB8AC3E}">
-        <p14:creationId xmlns:p14="http://schemas.microsoft.com/office/powerpoint/2010/main" val="1006906985"/>
+        <p14:creationId xmlns:p14="http://schemas.microsoft.com/office/powerpoint/2010/main" val="2669578412"/>
       </p:ext>
     </p:extLst>
   </p:cSld>
@@ -2333,7 +2418,7 @@
           <a:p>
             <a:fld id="{791F1524-C5FD-4370-8A10-5BE52A97A495}" type="slidenum">
               <a:rPr lang="en-US" smtClean="0"/>
-              <a:t>5</a:t>
+              <a:t>4</a:t>
             </a:fld>
             <a:endParaRPr lang="en-US"/>
           </a:p>
@@ -2342,7 +2427,7 @@
     </p:spTree>
     <p:extLst>
       <p:ext uri="{BB962C8B-B14F-4D97-AF65-F5344CB8AC3E}">
-        <p14:creationId xmlns:p14="http://schemas.microsoft.com/office/powerpoint/2010/main" val="4224625850"/>
+        <p14:creationId xmlns:p14="http://schemas.microsoft.com/office/powerpoint/2010/main" val="1006906985"/>
       </p:ext>
     </p:extLst>
   </p:cSld>
@@ -2396,10 +2481,7 @@
           <a:bodyPr/>
           <a:lstStyle/>
           <a:p>
-            <a:r>
-              <a:rPr lang="en-US" dirty="0"/>
-              <a:t>https://www.freecodecamp.org/news/machine-learning-mean-squared-error-regression-line-c7dde9a26b93/</a:t>
-            </a:r>
+            <a:endParaRPr lang="en-US" dirty="0"/>
           </a:p>
         </p:txBody>
       </p:sp>
@@ -2420,7 +2502,7 @@
           <a:p>
             <a:fld id="{791F1524-C5FD-4370-8A10-5BE52A97A495}" type="slidenum">
               <a:rPr lang="en-US" smtClean="0"/>
-              <a:t>6</a:t>
+              <a:t>5</a:t>
             </a:fld>
             <a:endParaRPr lang="en-US"/>
           </a:p>
@@ -2429,7 +2511,7 @@
     </p:spTree>
     <p:extLst>
       <p:ext uri="{BB962C8B-B14F-4D97-AF65-F5344CB8AC3E}">
-        <p14:creationId xmlns:p14="http://schemas.microsoft.com/office/powerpoint/2010/main" val="3032590862"/>
+        <p14:creationId xmlns:p14="http://schemas.microsoft.com/office/powerpoint/2010/main" val="4224625850"/>
       </p:ext>
     </p:extLst>
   </p:cSld>
@@ -2483,7 +2565,10 @@
           <a:bodyPr/>
           <a:lstStyle/>
           <a:p>
-            <a:endParaRPr lang="en-US" dirty="0"/>
+            <a:r>
+              <a:rPr lang="en-US" dirty="0"/>
+              <a:t>https://www.freecodecamp.org/news/machine-learning-mean-squared-error-regression-line-c7dde9a26b93/</a:t>
+            </a:r>
           </a:p>
         </p:txBody>
       </p:sp>
@@ -2504,7 +2589,7 @@
           <a:p>
             <a:fld id="{791F1524-C5FD-4370-8A10-5BE52A97A495}" type="slidenum">
               <a:rPr lang="en-US" smtClean="0"/>
-              <a:t>7</a:t>
+              <a:t>6</a:t>
             </a:fld>
             <a:endParaRPr lang="en-US"/>
           </a:p>
@@ -2513,7 +2598,7 @@
     </p:spTree>
     <p:extLst>
       <p:ext uri="{BB962C8B-B14F-4D97-AF65-F5344CB8AC3E}">
-        <p14:creationId xmlns:p14="http://schemas.microsoft.com/office/powerpoint/2010/main" val="1741838094"/>
+        <p14:creationId xmlns:p14="http://schemas.microsoft.com/office/powerpoint/2010/main" val="3032590862"/>
       </p:ext>
     </p:extLst>
   </p:cSld>
@@ -2588,7 +2673,7 @@
           <a:p>
             <a:fld id="{791F1524-C5FD-4370-8A10-5BE52A97A495}" type="slidenum">
               <a:rPr lang="en-US" smtClean="0"/>
-              <a:t>9</a:t>
+              <a:t>7</a:t>
             </a:fld>
             <a:endParaRPr lang="en-US"/>
           </a:p>
@@ -2597,7 +2682,7 @@
     </p:spTree>
     <p:extLst>
       <p:ext uri="{BB962C8B-B14F-4D97-AF65-F5344CB8AC3E}">
-        <p14:creationId xmlns:p14="http://schemas.microsoft.com/office/powerpoint/2010/main" val="889904001"/>
+        <p14:creationId xmlns:p14="http://schemas.microsoft.com/office/powerpoint/2010/main" val="1741838094"/>
       </p:ext>
     </p:extLst>
   </p:cSld>
@@ -2672,7 +2757,178 @@
           <a:p>
             <a:fld id="{791F1524-C5FD-4370-8A10-5BE52A97A495}" type="slidenum">
               <a:rPr lang="en-US" smtClean="0"/>
+              <a:t>9</a:t>
+            </a:fld>
+            <a:endParaRPr lang="en-US"/>
+          </a:p>
+        </p:txBody>
+      </p:sp>
+    </p:spTree>
+    <p:extLst>
+      <p:ext uri="{BB962C8B-B14F-4D97-AF65-F5344CB8AC3E}">
+        <p14:creationId xmlns:p14="http://schemas.microsoft.com/office/powerpoint/2010/main" val="889904001"/>
+      </p:ext>
+    </p:extLst>
+  </p:cSld>
+  <p:clrMapOvr>
+    <a:masterClrMapping/>
+  </p:clrMapOvr>
+</p:notes>
+</file>
+
+<file path=ppt/notesSlides/notesSlide8.xml><?xml version="1.0" encoding="utf-8"?>
+<p:notes xmlns:a="http://schemas.openxmlformats.org/drawingml/2006/main" xmlns:r="http://schemas.openxmlformats.org/officeDocument/2006/relationships" xmlns:p="http://schemas.openxmlformats.org/presentationml/2006/main">
+  <p:cSld>
+    <p:spTree>
+      <p:nvGrpSpPr>
+        <p:cNvPr id="1" name=""/>
+        <p:cNvGrpSpPr/>
+        <p:nvPr/>
+      </p:nvGrpSpPr>
+      <p:grpSpPr>
+        <a:xfrm>
+          <a:off x="0" y="0"/>
+          <a:ext cx="0" cy="0"/>
+          <a:chOff x="0" y="0"/>
+          <a:chExt cx="0" cy="0"/>
+        </a:xfrm>
+      </p:grpSpPr>
+      <p:sp>
+        <p:nvSpPr>
+          <p:cNvPr id="2" name="Slide Image Placeholder 1"/>
+          <p:cNvSpPr>
+            <a:spLocks noGrp="1" noRot="1" noChangeAspect="1"/>
+          </p:cNvSpPr>
+          <p:nvPr>
+            <p:ph type="sldImg"/>
+          </p:nvPr>
+        </p:nvSpPr>
+        <p:spPr/>
+      </p:sp>
+      <p:sp>
+        <p:nvSpPr>
+          <p:cNvPr id="3" name="Notes Placeholder 2"/>
+          <p:cNvSpPr>
+            <a:spLocks noGrp="1"/>
+          </p:cNvSpPr>
+          <p:nvPr>
+            <p:ph type="body" idx="1"/>
+          </p:nvPr>
+        </p:nvSpPr>
+        <p:spPr/>
+        <p:txBody>
+          <a:bodyPr/>
+          <a:lstStyle/>
+          <a:p>
+            <a:r>
+              <a:rPr lang="en-US" dirty="0"/>
+              <a:t>https://christophm.github.io/interpretable-ml-book/logistic.html</a:t>
+            </a:r>
+          </a:p>
+        </p:txBody>
+      </p:sp>
+      <p:sp>
+        <p:nvSpPr>
+          <p:cNvPr id="4" name="Slide Number Placeholder 3"/>
+          <p:cNvSpPr>
+            <a:spLocks noGrp="1"/>
+          </p:cNvSpPr>
+          <p:nvPr>
+            <p:ph type="sldNum" sz="quarter" idx="5"/>
+          </p:nvPr>
+        </p:nvSpPr>
+        <p:spPr/>
+        <p:txBody>
+          <a:bodyPr/>
+          <a:lstStyle/>
+          <a:p>
+            <a:fld id="{791F1524-C5FD-4370-8A10-5BE52A97A495}" type="slidenum">
+              <a:rPr lang="en-US" smtClean="0"/>
               <a:t>10</a:t>
+            </a:fld>
+            <a:endParaRPr lang="en-US"/>
+          </a:p>
+        </p:txBody>
+      </p:sp>
+    </p:spTree>
+    <p:extLst>
+      <p:ext uri="{BB962C8B-B14F-4D97-AF65-F5344CB8AC3E}">
+        <p14:creationId xmlns:p14="http://schemas.microsoft.com/office/powerpoint/2010/main" val="356788734"/>
+      </p:ext>
+    </p:extLst>
+  </p:cSld>
+  <p:clrMapOvr>
+    <a:masterClrMapping/>
+  </p:clrMapOvr>
+</p:notes>
+</file>
+
+<file path=ppt/notesSlides/notesSlide9.xml><?xml version="1.0" encoding="utf-8"?>
+<p:notes xmlns:a="http://schemas.openxmlformats.org/drawingml/2006/main" xmlns:r="http://schemas.openxmlformats.org/officeDocument/2006/relationships" xmlns:p="http://schemas.openxmlformats.org/presentationml/2006/main">
+  <p:cSld>
+    <p:spTree>
+      <p:nvGrpSpPr>
+        <p:cNvPr id="1" name=""/>
+        <p:cNvGrpSpPr/>
+        <p:nvPr/>
+      </p:nvGrpSpPr>
+      <p:grpSpPr>
+        <a:xfrm>
+          <a:off x="0" y="0"/>
+          <a:ext cx="0" cy="0"/>
+          <a:chOff x="0" y="0"/>
+          <a:chExt cx="0" cy="0"/>
+        </a:xfrm>
+      </p:grpSpPr>
+      <p:sp>
+        <p:nvSpPr>
+          <p:cNvPr id="2" name="Slide Image Placeholder 1"/>
+          <p:cNvSpPr>
+            <a:spLocks noGrp="1" noRot="1" noChangeAspect="1"/>
+          </p:cNvSpPr>
+          <p:nvPr>
+            <p:ph type="sldImg"/>
+          </p:nvPr>
+        </p:nvSpPr>
+        <p:spPr/>
+      </p:sp>
+      <p:sp>
+        <p:nvSpPr>
+          <p:cNvPr id="3" name="Notes Placeholder 2"/>
+          <p:cNvSpPr>
+            <a:spLocks noGrp="1"/>
+          </p:cNvSpPr>
+          <p:nvPr>
+            <p:ph type="body" idx="1"/>
+          </p:nvPr>
+        </p:nvSpPr>
+        <p:spPr/>
+        <p:txBody>
+          <a:bodyPr/>
+          <a:lstStyle/>
+          <a:p>
+            <a:endParaRPr lang="en-US" dirty="0"/>
+          </a:p>
+        </p:txBody>
+      </p:sp>
+      <p:sp>
+        <p:nvSpPr>
+          <p:cNvPr id="4" name="Slide Number Placeholder 3"/>
+          <p:cNvSpPr>
+            <a:spLocks noGrp="1"/>
+          </p:cNvSpPr>
+          <p:nvPr>
+            <p:ph type="sldNum" sz="quarter" idx="5"/>
+          </p:nvPr>
+        </p:nvSpPr>
+        <p:spPr/>
+        <p:txBody>
+          <a:bodyPr/>
+          <a:lstStyle/>
+          <a:p>
+            <a:fld id="{791F1524-C5FD-4370-8A10-5BE52A97A495}" type="slidenum">
+              <a:rPr lang="en-US" smtClean="0"/>
+              <a:t>11</a:t>
             </a:fld>
             <a:endParaRPr lang="en-US"/>
           </a:p>
@@ -2885,7 +3141,7 @@
           <a:p>
             <a:fld id="{ACF1A1B0-862D-4909-A7DB-D8ADA062DFCA}" type="datetimeFigureOut">
               <a:rPr lang="en-US" dirty="0"/>
-              <a:t>5/27/2021</a:t>
+              <a:t>5/30/2021</a:t>
             </a:fld>
             <a:endParaRPr lang="en-US"/>
           </a:p>
@@ -3108,7 +3364,7 @@
           <a:p>
             <a:fld id="{7B156144-9CB7-4E3A-B87E-A382F9BE05EF}" type="datetimeFigureOut">
               <a:rPr lang="en-US" dirty="0"/>
-              <a:t>5/27/2021</a:t>
+              <a:t>5/30/2021</a:t>
             </a:fld>
             <a:endParaRPr lang="en-US"/>
           </a:p>
@@ -3286,7 +3542,7 @@
           <a:p>
             <a:fld id="{2643D55F-46AB-4791-9172-4FA8DD3A6A9C}" type="datetimeFigureOut">
               <a:rPr lang="en-US" dirty="0"/>
-              <a:t>5/27/2021</a:t>
+              <a:t>5/30/2021</a:t>
             </a:fld>
             <a:endParaRPr lang="en-US"/>
           </a:p>
@@ -3454,7 +3710,7 @@
           <a:p>
             <a:fld id="{58026881-8A08-449C-8D73-E5F201F814C1}" type="datetimeFigureOut">
               <a:rPr lang="en-US" dirty="0"/>
-              <a:t>5/27/2021</a:t>
+              <a:t>5/30/2021</a:t>
             </a:fld>
             <a:endParaRPr lang="en-US"/>
           </a:p>
@@ -3744,7 +4000,7 @@
           <a:p>
             <a:fld id="{1BEB5A5E-0C07-4E93-A112-D37B4D166B30}" type="datetimeFigureOut">
               <a:rPr lang="en-US" dirty="0"/>
-              <a:t>5/27/2021</a:t>
+              <a:t>5/30/2021</a:t>
             </a:fld>
             <a:endParaRPr lang="en-US"/>
           </a:p>
@@ -4067,7 +4323,7 @@
           <a:p>
             <a:fld id="{9E1F71C5-DC57-4358-A1EA-30C08AF6E3C5}" type="datetimeFigureOut">
               <a:rPr lang="en-US" dirty="0"/>
-              <a:t>5/27/2021</a:t>
+              <a:t>5/30/2021</a:t>
             </a:fld>
             <a:endParaRPr lang="en-US"/>
           </a:p>
@@ -4476,7 +4732,7 @@
           <a:p>
             <a:fld id="{12571DBA-DE60-4731-B773-47AAA185C143}" type="datetimeFigureOut">
               <a:rPr lang="en-US" dirty="0"/>
-              <a:t>5/27/2021</a:t>
+              <a:t>5/30/2021</a:t>
             </a:fld>
             <a:endParaRPr lang="en-US"/>
           </a:p>
@@ -4593,7 +4849,7 @@
           <a:p>
             <a:fld id="{4F170639-886C-4FCF-9EAB-ABB5DA3F3F4A}" type="datetimeFigureOut">
               <a:rPr lang="en-US" dirty="0"/>
-              <a:t>5/27/2021</a:t>
+              <a:t>5/30/2021</a:t>
             </a:fld>
             <a:endParaRPr lang="en-US"/>
           </a:p>
@@ -4688,7 +4944,7 @@
           <a:p>
             <a:fld id="{34C4A628-C83B-4C66-83F4-1711CE3738FD}" type="datetimeFigureOut">
               <a:rPr lang="en-US" dirty="0"/>
-              <a:t>5/27/2021</a:t>
+              <a:t>5/30/2021</a:t>
             </a:fld>
             <a:endParaRPr lang="en-US"/>
           </a:p>
@@ -4973,7 +5229,7 @@
           <a:p>
             <a:fld id="{B88C1D73-9400-43CA-A37F-F9B7D00DE14C}" type="datetimeFigureOut">
               <a:rPr lang="en-US" dirty="0"/>
-              <a:t>5/27/2021</a:t>
+              <a:t>5/30/2021</a:t>
             </a:fld>
             <a:endParaRPr lang="en-US"/>
           </a:p>
@@ -5245,7 +5501,7 @@
           <a:p>
             <a:fld id="{188B7711-B905-4633-B4D7-6F3A49A2E7D9}" type="datetimeFigureOut">
               <a:rPr lang="en-US" dirty="0"/>
-              <a:t>5/27/2021</a:t>
+              <a:t>5/30/2021</a:t>
             </a:fld>
             <a:endParaRPr lang="en-US"/>
           </a:p>
@@ -5495,7 +5751,7 @@
             <a:fld id="{89C235CF-BDA2-4E7E-8BBD-350479985E74}" type="datetimeFigureOut">
               <a:rPr lang="en-US" dirty="0"/>
               <a:pPr/>
-              <a:t>5/27/2021</a:t>
+              <a:t>5/30/2021</a:t>
             </a:fld>
             <a:endParaRPr lang="en-US"/>
           </a:p>
@@ -6042,6 +6298,17 @@
 <file path=ppt/slides/slide10.xml><?xml version="1.0" encoding="utf-8"?>
 <p:sld xmlns:a="http://schemas.openxmlformats.org/drawingml/2006/main" xmlns:r="http://schemas.openxmlformats.org/officeDocument/2006/relationships" xmlns:p="http://schemas.openxmlformats.org/presentationml/2006/main">
   <p:cSld>
+    <p:bg>
+      <p:bgPr>
+        <a:solidFill>
+          <a:schemeClr val="bg1">
+            <a:tint val="95000"/>
+            <a:satMod val="170000"/>
+          </a:schemeClr>
+        </a:solidFill>
+        <a:effectLst/>
+      </p:bgPr>
+    </p:bg>
     <p:spTree>
       <p:nvGrpSpPr>
         <p:cNvPr id="1" name=""/>
@@ -6056,6 +6323,285 @@
           <a:chExt cx="0" cy="0"/>
         </a:xfrm>
       </p:grpSpPr>
+      <p:sp useBgFill="1">
+        <p:nvSpPr>
+          <p:cNvPr id="8" name="Rectangle 7">
+            <a:extLst>
+              <a:ext uri="{FF2B5EF4-FFF2-40B4-BE49-F238E27FC236}">
+                <a16:creationId xmlns:a16="http://schemas.microsoft.com/office/drawing/2014/main" id="{0AE80D91-18AA-438F-BFF4-E6BABFDFBABE}"/>
+              </a:ext>
+              <a:ext uri="{C183D7F6-B498-43B3-948B-1728B52AA6E4}">
+                <adec:decorative xmlns:adec="http://schemas.microsoft.com/office/drawing/2017/decorative" val="1"/>
+              </a:ext>
+            </a:extLst>
+          </p:cNvPr>
+          <p:cNvSpPr>
+            <a:spLocks noGrp="1" noRot="1" noChangeAspect="1" noMove="1" noResize="1" noEditPoints="1" noAdjustHandles="1" noChangeArrowheads="1" noChangeShapeType="1" noTextEdit="1"/>
+          </p:cNvSpPr>
+          <p:nvPr>
+            <p:extLst>
+              <p:ext uri="{386F3935-93C4-4BCD-93E2-E3B085C9AB24}">
+                <p16:designElem xmlns:p16="http://schemas.microsoft.com/office/powerpoint/2015/main" val="1"/>
+              </p:ext>
+            </p:extLst>
+          </p:nvPr>
+        </p:nvSpPr>
+        <p:spPr>
+          <a:xfrm>
+            <a:off x="0" y="0"/>
+            <a:ext cx="11292841" cy="6858000"/>
+          </a:xfrm>
+          <a:prstGeom prst="rect">
+            <a:avLst/>
+          </a:prstGeom>
+          <a:ln>
+            <a:noFill/>
+          </a:ln>
+        </p:spPr>
+        <p:style>
+          <a:lnRef idx="2">
+            <a:schemeClr val="accent1">
+              <a:shade val="50000"/>
+            </a:schemeClr>
+          </a:lnRef>
+          <a:fillRef idx="1">
+            <a:schemeClr val="accent1"/>
+          </a:fillRef>
+          <a:effectRef idx="0">
+            <a:schemeClr val="accent1"/>
+          </a:effectRef>
+          <a:fontRef idx="minor">
+            <a:schemeClr val="lt1"/>
+          </a:fontRef>
+        </p:style>
+      </p:sp>
+      <p:sp>
+        <p:nvSpPr>
+          <p:cNvPr id="10" name="Rectangle 9">
+            <a:extLst>
+              <a:ext uri="{FF2B5EF4-FFF2-40B4-BE49-F238E27FC236}">
+                <a16:creationId xmlns:a16="http://schemas.microsoft.com/office/drawing/2014/main" id="{EF05C5AB-8A34-4DF3-AB54-AD74AA4324E8}"/>
+              </a:ext>
+              <a:ext uri="{C183D7F6-B498-43B3-948B-1728B52AA6E4}">
+                <adec:decorative xmlns:adec="http://schemas.microsoft.com/office/drawing/2017/decorative" val="1"/>
+              </a:ext>
+            </a:extLst>
+          </p:cNvPr>
+          <p:cNvSpPr>
+            <a:spLocks noGrp="1" noRot="1" noChangeAspect="1" noMove="1" noResize="1" noEditPoints="1" noAdjustHandles="1" noChangeArrowheads="1" noChangeShapeType="1" noTextEdit="1"/>
+          </p:cNvSpPr>
+          <p:nvPr>
+            <p:extLst>
+              <p:ext uri="{386F3935-93C4-4BCD-93E2-E3B085C9AB24}">
+                <p16:designElem xmlns:p16="http://schemas.microsoft.com/office/powerpoint/2015/main" val="1"/>
+              </p:ext>
+            </p:extLst>
+          </p:nvPr>
+        </p:nvSpPr>
+        <p:spPr>
+          <a:xfrm>
+            <a:off x="6104698" y="0"/>
+            <a:ext cx="5188141" cy="6865461"/>
+          </a:xfrm>
+          <a:prstGeom prst="rect">
+            <a:avLst/>
+          </a:prstGeom>
+          <a:solidFill>
+            <a:schemeClr val="accent1">
+              <a:lumMod val="75000"/>
+            </a:schemeClr>
+          </a:solidFill>
+          <a:ln>
+            <a:noFill/>
+          </a:ln>
+        </p:spPr>
+        <p:style>
+          <a:lnRef idx="2">
+            <a:schemeClr val="accent1">
+              <a:shade val="50000"/>
+            </a:schemeClr>
+          </a:lnRef>
+          <a:fillRef idx="1">
+            <a:schemeClr val="accent1"/>
+          </a:fillRef>
+          <a:effectRef idx="0">
+            <a:schemeClr val="accent1"/>
+          </a:effectRef>
+          <a:fontRef idx="minor">
+            <a:schemeClr val="lt1"/>
+          </a:fontRef>
+        </p:style>
+      </p:sp>
+      <p:sp>
+        <p:nvSpPr>
+          <p:cNvPr id="2" name="Title 1">
+            <a:extLst>
+              <a:ext uri="{FF2B5EF4-FFF2-40B4-BE49-F238E27FC236}">
+                <a16:creationId xmlns:a16="http://schemas.microsoft.com/office/drawing/2014/main" id="{17210476-395A-4EED-A215-A41055E182FA}"/>
+              </a:ext>
+            </a:extLst>
+          </p:cNvPr>
+          <p:cNvSpPr>
+            <a:spLocks noGrp="1"/>
+          </p:cNvSpPr>
+          <p:nvPr>
+            <p:ph type="title"/>
+          </p:nvPr>
+        </p:nvSpPr>
+        <p:spPr>
+          <a:xfrm>
+            <a:off x="6902937" y="643466"/>
+            <a:ext cx="3962658" cy="5376334"/>
+          </a:xfrm>
+        </p:spPr>
+        <p:txBody>
+          <a:bodyPr anchor="ctr">
+            <a:normAutofit/>
+          </a:bodyPr>
+          <a:lstStyle/>
+          <a:p>
+            <a:r>
+              <a:rPr lang="en-US" sz="3600">
+                <a:solidFill>
+                  <a:srgbClr val="FFFFFF"/>
+                </a:solidFill>
+              </a:rPr>
+              <a:t>Questions from the Reading</a:t>
+            </a:r>
+          </a:p>
+        </p:txBody>
+      </p:sp>
+      <p:sp>
+        <p:nvSpPr>
+          <p:cNvPr id="3" name="Content Placeholder 2">
+            <a:extLst>
+              <a:ext uri="{FF2B5EF4-FFF2-40B4-BE49-F238E27FC236}">
+                <a16:creationId xmlns:a16="http://schemas.microsoft.com/office/drawing/2014/main" id="{A005DF0F-4EA5-4467-894E-E658FB7FA624}"/>
+              </a:ext>
+            </a:extLst>
+          </p:cNvPr>
+          <p:cNvSpPr>
+            <a:spLocks noGrp="1"/>
+          </p:cNvSpPr>
+          <p:nvPr>
+            <p:ph idx="1"/>
+          </p:nvPr>
+        </p:nvSpPr>
+        <p:spPr>
+          <a:xfrm>
+            <a:off x="643467" y="643467"/>
+            <a:ext cx="4817766" cy="5578528"/>
+          </a:xfrm>
+        </p:spPr>
+        <p:txBody>
+          <a:bodyPr anchor="ctr">
+            <a:normAutofit/>
+          </a:bodyPr>
+          <a:lstStyle/>
+          <a:p>
+            <a:r>
+              <a:rPr lang="en-US" dirty="0"/>
+              <a:t>Why can’t linear regression work for the types of problems we use logistic regression for?</a:t>
+            </a:r>
+          </a:p>
+          <a:p>
+            <a:endParaRPr lang="en-US" dirty="0"/>
+          </a:p>
+          <a:p>
+            <a:r>
+              <a:rPr lang="en-US" dirty="0"/>
+              <a:t>What is complete separation? Why is it a problem?</a:t>
+            </a:r>
+          </a:p>
+        </p:txBody>
+      </p:sp>
+      <p:sp>
+        <p:nvSpPr>
+          <p:cNvPr id="12" name="Rectangle 11">
+            <a:extLst>
+              <a:ext uri="{FF2B5EF4-FFF2-40B4-BE49-F238E27FC236}">
+                <a16:creationId xmlns:a16="http://schemas.microsoft.com/office/drawing/2014/main" id="{AA3B856C-9196-4702-BED7-5733C7EAA667}"/>
+              </a:ext>
+              <a:ext uri="{C183D7F6-B498-43B3-948B-1728B52AA6E4}">
+                <adec:decorative xmlns:adec="http://schemas.microsoft.com/office/drawing/2017/decorative" val="1"/>
+              </a:ext>
+            </a:extLst>
+          </p:cNvPr>
+          <p:cNvSpPr>
+            <a:spLocks noGrp="1" noRot="1" noChangeAspect="1" noMove="1" noResize="1" noEditPoints="1" noAdjustHandles="1" noChangeArrowheads="1" noChangeShapeType="1" noTextEdit="1"/>
+          </p:cNvSpPr>
+          <p:nvPr>
+            <p:extLst>
+              <p:ext uri="{386F3935-93C4-4BCD-93E2-E3B085C9AB24}">
+                <p16:designElem xmlns:p16="http://schemas.microsoft.com/office/powerpoint/2015/main" val="1"/>
+              </p:ext>
+            </p:extLst>
+          </p:nvPr>
+        </p:nvSpPr>
+        <p:spPr>
+          <a:xfrm>
+            <a:off x="11296650" y="0"/>
+            <a:ext cx="914400" cy="6858000"/>
+          </a:xfrm>
+          <a:prstGeom prst="rect">
+            <a:avLst/>
+          </a:prstGeom>
+          <a:solidFill>
+            <a:schemeClr val="tx2">
+              <a:lumMod val="75000"/>
+            </a:schemeClr>
+          </a:solidFill>
+          <a:ln>
+            <a:noFill/>
+          </a:ln>
+        </p:spPr>
+        <p:style>
+          <a:lnRef idx="2">
+            <a:schemeClr val="accent1">
+              <a:shade val="50000"/>
+            </a:schemeClr>
+          </a:lnRef>
+          <a:fillRef idx="1">
+            <a:schemeClr val="accent1"/>
+          </a:fillRef>
+          <a:effectRef idx="0">
+            <a:schemeClr val="accent1"/>
+          </a:effectRef>
+          <a:fontRef idx="minor">
+            <a:schemeClr val="lt1"/>
+          </a:fontRef>
+        </p:style>
+      </p:sp>
+    </p:spTree>
+    <p:extLst>
+      <p:ext uri="{BB962C8B-B14F-4D97-AF65-F5344CB8AC3E}">
+        <p14:creationId xmlns:p14="http://schemas.microsoft.com/office/powerpoint/2010/main" val="3925805843"/>
+      </p:ext>
+    </p:extLst>
+  </p:cSld>
+  <p:clrMapOvr>
+    <a:overrideClrMapping bg1="lt1" tx1="dk1" bg2="lt2" tx2="dk2" accent1="accent1" accent2="accent2" accent3="accent3" accent4="accent4" accent5="accent5" accent6="accent6" hlink="hlink" folHlink="folHlink"/>
+  </p:clrMapOvr>
+</p:sld>
+</file>
+
+<file path=ppt/slides/slide11.xml><?xml version="1.0" encoding="utf-8"?>
+<p:sld xmlns:a="http://schemas.openxmlformats.org/drawingml/2006/main" xmlns:r="http://schemas.openxmlformats.org/officeDocument/2006/relationships" xmlns:p="http://schemas.openxmlformats.org/presentationml/2006/main">
+  <p:cSld>
+    <p:spTree>
+      <p:nvGrpSpPr>
+        <p:cNvPr id="1" name=""/>
+        <p:cNvGrpSpPr/>
+        <p:nvPr/>
+      </p:nvGrpSpPr>
+      <p:grpSpPr>
+        <a:xfrm>
+          <a:off x="0" y="0"/>
+          <a:ext cx="0" cy="0"/>
+          <a:chOff x="0" y="0"/>
+          <a:chExt cx="0" cy="0"/>
+        </a:xfrm>
+      </p:grpSpPr>
       <p:sp>
         <p:nvSpPr>
           <p:cNvPr id="2" name="Title 1">
@@ -6251,7 +6797,7 @@
 </p:sld>
 </file>
 
-<file path=ppt/slides/slide11.xml><?xml version="1.0" encoding="utf-8"?>
+<file path=ppt/slides/slide12.xml><?xml version="1.0" encoding="utf-8"?>
 <p:sld xmlns:a="http://schemas.openxmlformats.org/drawingml/2006/main" xmlns:r="http://schemas.openxmlformats.org/officeDocument/2006/relationships" xmlns:p="http://schemas.openxmlformats.org/presentationml/2006/main">
   <p:cSld>
     <p:spTree>
@@ -6569,13 +7115,21 @@
           <a:p>
             <a:r>
               <a:rPr lang="en-US" dirty="0"/>
-              <a:t>Logistic Regression (25 mins) </a:t>
+              <a:t>Logistic Regression (20 mins) </a:t>
             </a:r>
           </a:p>
           <a:p>
             <a:r>
               <a:rPr lang="en-US" dirty="0"/>
-              <a:t>Other Ways to Evaluate Models Besides Using Accuracy (5 mins)</a:t>
+              <a:t>Other Ways to Evaluate Models Besides Using </a:t>
+            </a:r>
+            <a:r>
+              <a:rPr lang="en-US"/>
+              <a:t>Accuracy (10 </a:t>
+            </a:r>
+            <a:r>
+              <a:rPr lang="en-US" dirty="0"/>
+              <a:t>mins)</a:t>
             </a:r>
           </a:p>
           <a:p>
@@ -6819,7 +7373,7 @@
           <a:p>
             <a:r>
               <a:rPr lang="en-US" dirty="0"/>
-              <a:t>How do we know which columns to choose? We look at p-values, we compare the R² values before and after a feature is added, and </a:t>
+              <a:t>How do we know which columns to choose? We look at correlations, we compare the R² values before and after a feature is added, and </a:t>
             </a:r>
             <a:r>
               <a:rPr lang="en-US" dirty="0" err="1"/>
@@ -7410,18 +7964,31 @@
           <a:p>
             <a:r>
               <a:rPr lang="en-US" sz="1600" dirty="0"/>
-              <a:t>Used when trying to predict the answer to a yes/no question or any </a:t>
-            </a:r>
-            <a:r>
-              <a:rPr lang="en-US" sz="1600"/>
-              <a:t>binary question</a:t>
-            </a:r>
+              <a:t>Used when trying to predict the answer to a yes/no question or any binary question</a:t>
+            </a:r>
+          </a:p>
+          <a:p>
+            <a:r>
+              <a:rPr lang="en-US" sz="1600" dirty="0"/>
+              <a:t>Response follows an S-shaped curve</a:t>
+            </a:r>
+          </a:p>
+          <a:p>
             <a:endParaRPr lang="en-US" sz="1600" dirty="0"/>
           </a:p>
           <a:p>
             <a:endParaRPr lang="en-US" sz="1600" dirty="0"/>
           </a:p>
           <a:p>
+            <a:endParaRPr lang="en-US" sz="1600" dirty="0"/>
+          </a:p>
+          <a:p>
+            <a:endParaRPr lang="en-US" sz="1600" dirty="0"/>
+          </a:p>
+          <a:p>
+            <a:pPr marL="0" indent="0">
+              <a:buNone/>
+            </a:pPr>
             <a:endParaRPr lang="en-US" sz="1600" dirty="0"/>
           </a:p>
         </p:txBody>

</xml_diff>

<commit_message>
week 14 in-class activity update
</commit_message>
<xml_diff>
--- a/course_material/week_14/week_14_presentation.pptx
+++ b/course_material/week_14/week_14_presentation.pptx
@@ -1834,7 +1834,7 @@
           <a:p>
             <a:fld id="{5CF9EFDB-215C-4120-ADCB-EAD745B7163E}" type="datetimeFigureOut">
               <a:rPr lang="en-US" smtClean="0"/>
-              <a:t>12/14/2021</a:t>
+              <a:t>12/22/2021</a:t>
             </a:fld>
             <a:endParaRPr lang="en-US"/>
           </a:p>
@@ -3141,7 +3141,7 @@
           <a:p>
             <a:fld id="{ACF1A1B0-862D-4909-A7DB-D8ADA062DFCA}" type="datetimeFigureOut">
               <a:rPr lang="en-US" dirty="0"/>
-              <a:t>12/14/2021</a:t>
+              <a:t>12/22/2021</a:t>
             </a:fld>
             <a:endParaRPr lang="en-US"/>
           </a:p>
@@ -3364,7 +3364,7 @@
           <a:p>
             <a:fld id="{7B156144-9CB7-4E3A-B87E-A382F9BE05EF}" type="datetimeFigureOut">
               <a:rPr lang="en-US" dirty="0"/>
-              <a:t>12/14/2021</a:t>
+              <a:t>12/22/2021</a:t>
             </a:fld>
             <a:endParaRPr lang="en-US"/>
           </a:p>
@@ -3542,7 +3542,7 @@
           <a:p>
             <a:fld id="{2643D55F-46AB-4791-9172-4FA8DD3A6A9C}" type="datetimeFigureOut">
               <a:rPr lang="en-US" dirty="0"/>
-              <a:t>12/14/2021</a:t>
+              <a:t>12/22/2021</a:t>
             </a:fld>
             <a:endParaRPr lang="en-US"/>
           </a:p>
@@ -3710,7 +3710,7 @@
           <a:p>
             <a:fld id="{58026881-8A08-449C-8D73-E5F201F814C1}" type="datetimeFigureOut">
               <a:rPr lang="en-US" dirty="0"/>
-              <a:t>12/14/2021</a:t>
+              <a:t>12/22/2021</a:t>
             </a:fld>
             <a:endParaRPr lang="en-US"/>
           </a:p>
@@ -4000,7 +4000,7 @@
           <a:p>
             <a:fld id="{1BEB5A5E-0C07-4E93-A112-D37B4D166B30}" type="datetimeFigureOut">
               <a:rPr lang="en-US" dirty="0"/>
-              <a:t>12/14/2021</a:t>
+              <a:t>12/22/2021</a:t>
             </a:fld>
             <a:endParaRPr lang="en-US"/>
           </a:p>
@@ -4323,7 +4323,7 @@
           <a:p>
             <a:fld id="{9E1F71C5-DC57-4358-A1EA-30C08AF6E3C5}" type="datetimeFigureOut">
               <a:rPr lang="en-US" dirty="0"/>
-              <a:t>12/14/2021</a:t>
+              <a:t>12/22/2021</a:t>
             </a:fld>
             <a:endParaRPr lang="en-US"/>
           </a:p>
@@ -4732,7 +4732,7 @@
           <a:p>
             <a:fld id="{12571DBA-DE60-4731-B773-47AAA185C143}" type="datetimeFigureOut">
               <a:rPr lang="en-US" dirty="0"/>
-              <a:t>12/14/2021</a:t>
+              <a:t>12/22/2021</a:t>
             </a:fld>
             <a:endParaRPr lang="en-US"/>
           </a:p>
@@ -4849,7 +4849,7 @@
           <a:p>
             <a:fld id="{4F170639-886C-4FCF-9EAB-ABB5DA3F3F4A}" type="datetimeFigureOut">
               <a:rPr lang="en-US" dirty="0"/>
-              <a:t>12/14/2021</a:t>
+              <a:t>12/22/2021</a:t>
             </a:fld>
             <a:endParaRPr lang="en-US"/>
           </a:p>
@@ -4944,7 +4944,7 @@
           <a:p>
             <a:fld id="{34C4A628-C83B-4C66-83F4-1711CE3738FD}" type="datetimeFigureOut">
               <a:rPr lang="en-US" dirty="0"/>
-              <a:t>12/14/2021</a:t>
+              <a:t>12/22/2021</a:t>
             </a:fld>
             <a:endParaRPr lang="en-US"/>
           </a:p>
@@ -5229,7 +5229,7 @@
           <a:p>
             <a:fld id="{B88C1D73-9400-43CA-A37F-F9B7D00DE14C}" type="datetimeFigureOut">
               <a:rPr lang="en-US" dirty="0"/>
-              <a:t>12/14/2021</a:t>
+              <a:t>12/22/2021</a:t>
             </a:fld>
             <a:endParaRPr lang="en-US"/>
           </a:p>
@@ -5501,7 +5501,7 @@
           <a:p>
             <a:fld id="{188B7711-B905-4633-B4D7-6F3A49A2E7D9}" type="datetimeFigureOut">
               <a:rPr lang="en-US" dirty="0"/>
-              <a:t>12/14/2021</a:t>
+              <a:t>12/22/2021</a:t>
             </a:fld>
             <a:endParaRPr lang="en-US"/>
           </a:p>
@@ -5751,7 +5751,7 @@
             <a:fld id="{89C235CF-BDA2-4E7E-8BBD-350479985E74}" type="datetimeFigureOut">
               <a:rPr lang="en-US" dirty="0"/>
               <a:pPr/>
-              <a:t>12/14/2021</a:t>
+              <a:t>12/22/2021</a:t>
             </a:fld>
             <a:endParaRPr lang="en-US"/>
           </a:p>
@@ -7097,25 +7097,33 @@
           <a:p>
             <a:r>
               <a:rPr lang="en-US" dirty="0"/>
-              <a:t>Review Homework ( 20 mins)</a:t>
+              <a:t>Review Homework (15 mins)</a:t>
             </a:r>
           </a:p>
           <a:p>
             <a:r>
               <a:rPr lang="en-US" dirty="0"/>
-              <a:t>Multiple Linear Regression (25 mins)</a:t>
+              <a:t>Multiple Linear Regression </a:t>
+            </a:r>
+            <a:r>
+              <a:rPr lang="en-US"/>
+              <a:t>(25 </a:t>
+            </a:r>
+            <a:r>
+              <a:rPr lang="en-US" dirty="0"/>
+              <a:t>mins)</a:t>
+            </a:r>
+          </a:p>
+          <a:p>
+            <a:r>
+              <a:rPr lang="en-US" dirty="0"/>
+              <a:t>Logistic Regression (30 mins) </a:t>
             </a:r>
           </a:p>
           <a:p>
             <a:r>
               <a:rPr lang="en-US" dirty="0"/>
               <a:t>Break (10 mins) </a:t>
-            </a:r>
-          </a:p>
-          <a:p>
-            <a:r>
-              <a:rPr lang="en-US" dirty="0"/>
-              <a:t>Logistic Regression (25 mins) </a:t>
             </a:r>
           </a:p>
           <a:p>
@@ -7831,7 +7839,17 @@
                 <a:effectLst/>
                 <a:latin typeface="Slack-Lato"/>
               </a:rPr>
-              <a:t>CSSConjurer</a:t>
+              <a:t>ProdigiousProgrammingPowers</a:t>
+            </a:r>
+            <a:r>
+              <a:rPr lang="en-US" b="0" i="0" dirty="0">
+                <a:solidFill>
+                  <a:schemeClr val="tx1"/>
+                </a:solidFill>
+                <a:effectLst/>
+                <a:latin typeface="Slack-Lato"/>
+              </a:rPr>
+              <a:t> </a:t>
             </a:r>
             <a:r>
               <a:rPr lang="en-US" b="0" i="0" dirty="0">

</xml_diff>